<commit_message>
ajout entity user et formation
</commit_message>
<xml_diff>
--- a/conception/MLD.pptx
+++ b/conception/MLD.pptx
@@ -243,7 +243,7 @@
           <a:p>
             <a:fld id="{EF01C58B-5987-4695-85EC-93A3A045C1F4}" type="datetimeFigureOut">
               <a:rPr lang="fr-FR" smtClean="0"/>
-              <a:t>27/02/2020</a:t>
+              <a:t>28/02/2020</a:t>
             </a:fld>
             <a:endParaRPr lang="fr-FR" dirty="0"/>
           </a:p>
@@ -413,7 +413,7 @@
           <a:p>
             <a:fld id="{EF01C58B-5987-4695-85EC-93A3A045C1F4}" type="datetimeFigureOut">
               <a:rPr lang="fr-FR" smtClean="0"/>
-              <a:t>27/02/2020</a:t>
+              <a:t>28/02/2020</a:t>
             </a:fld>
             <a:endParaRPr lang="fr-FR" dirty="0"/>
           </a:p>
@@ -593,7 +593,7 @@
           <a:p>
             <a:fld id="{EF01C58B-5987-4695-85EC-93A3A045C1F4}" type="datetimeFigureOut">
               <a:rPr lang="fr-FR" smtClean="0"/>
-              <a:t>27/02/2020</a:t>
+              <a:t>28/02/2020</a:t>
             </a:fld>
             <a:endParaRPr lang="fr-FR" dirty="0"/>
           </a:p>
@@ -763,7 +763,7 @@
           <a:p>
             <a:fld id="{EF01C58B-5987-4695-85EC-93A3A045C1F4}" type="datetimeFigureOut">
               <a:rPr lang="fr-FR" smtClean="0"/>
-              <a:t>27/02/2020</a:t>
+              <a:t>28/02/2020</a:t>
             </a:fld>
             <a:endParaRPr lang="fr-FR" dirty="0"/>
           </a:p>
@@ -1009,7 +1009,7 @@
           <a:p>
             <a:fld id="{EF01C58B-5987-4695-85EC-93A3A045C1F4}" type="datetimeFigureOut">
               <a:rPr lang="fr-FR" smtClean="0"/>
-              <a:t>27/02/2020</a:t>
+              <a:t>28/02/2020</a:t>
             </a:fld>
             <a:endParaRPr lang="fr-FR" dirty="0"/>
           </a:p>
@@ -1241,7 +1241,7 @@
           <a:p>
             <a:fld id="{EF01C58B-5987-4695-85EC-93A3A045C1F4}" type="datetimeFigureOut">
               <a:rPr lang="fr-FR" smtClean="0"/>
-              <a:t>27/02/2020</a:t>
+              <a:t>28/02/2020</a:t>
             </a:fld>
             <a:endParaRPr lang="fr-FR" dirty="0"/>
           </a:p>
@@ -1608,7 +1608,7 @@
           <a:p>
             <a:fld id="{EF01C58B-5987-4695-85EC-93A3A045C1F4}" type="datetimeFigureOut">
               <a:rPr lang="fr-FR" smtClean="0"/>
-              <a:t>27/02/2020</a:t>
+              <a:t>28/02/2020</a:t>
             </a:fld>
             <a:endParaRPr lang="fr-FR" dirty="0"/>
           </a:p>
@@ -1726,7 +1726,7 @@
           <a:p>
             <a:fld id="{EF01C58B-5987-4695-85EC-93A3A045C1F4}" type="datetimeFigureOut">
               <a:rPr lang="fr-FR" smtClean="0"/>
-              <a:t>27/02/2020</a:t>
+              <a:t>28/02/2020</a:t>
             </a:fld>
             <a:endParaRPr lang="fr-FR" dirty="0"/>
           </a:p>
@@ -1821,7 +1821,7 @@
           <a:p>
             <a:fld id="{EF01C58B-5987-4695-85EC-93A3A045C1F4}" type="datetimeFigureOut">
               <a:rPr lang="fr-FR" smtClean="0"/>
-              <a:t>27/02/2020</a:t>
+              <a:t>28/02/2020</a:t>
             </a:fld>
             <a:endParaRPr lang="fr-FR" dirty="0"/>
           </a:p>
@@ -2098,7 +2098,7 @@
           <a:p>
             <a:fld id="{EF01C58B-5987-4695-85EC-93A3A045C1F4}" type="datetimeFigureOut">
               <a:rPr lang="fr-FR" smtClean="0"/>
-              <a:t>27/02/2020</a:t>
+              <a:t>28/02/2020</a:t>
             </a:fld>
             <a:endParaRPr lang="fr-FR" dirty="0"/>
           </a:p>
@@ -2351,7 +2351,7 @@
           <a:p>
             <a:fld id="{EF01C58B-5987-4695-85EC-93A3A045C1F4}" type="datetimeFigureOut">
               <a:rPr lang="fr-FR" smtClean="0"/>
-              <a:t>27/02/2020</a:t>
+              <a:t>28/02/2020</a:t>
             </a:fld>
             <a:endParaRPr lang="fr-FR" dirty="0"/>
           </a:p>
@@ -2564,7 +2564,7 @@
           <a:p>
             <a:fld id="{EF01C58B-5987-4695-85EC-93A3A045C1F4}" type="datetimeFigureOut">
               <a:rPr lang="fr-FR" smtClean="0"/>
-              <a:t>27/02/2020</a:t>
+              <a:t>28/02/2020</a:t>
             </a:fld>
             <a:endParaRPr lang="fr-FR" dirty="0"/>
           </a:p>
@@ -3219,7 +3219,7 @@
           <p:spPr>
             <a:xfrm>
               <a:off x="4658008" y="1051236"/>
-              <a:ext cx="2670772" cy="2031325"/>
+              <a:ext cx="2670772" cy="2246769"/>
             </a:xfrm>
             <a:prstGeom prst="rect">
               <a:avLst/>
@@ -3246,8 +3246,15 @@
             <a:p>
               <a:r>
                 <a:rPr lang="fr-FR" sz="1400" dirty="0" smtClean="0"/>
-                <a:t>Pseudo</a:t>
+                <a:t>Nom</a:t>
               </a:r>
+            </a:p>
+            <a:p>
+              <a:r>
+                <a:rPr lang="fr-FR" sz="1400" dirty="0" err="1" smtClean="0"/>
+                <a:t>Prenom</a:t>
+              </a:r>
+              <a:endParaRPr lang="fr-FR" sz="1400" dirty="0" smtClean="0"/>
             </a:p>
             <a:p>
               <a:r>

</xml_diff>